<commit_message>
Updated sprint 2 ppt and created missing pdfs
</commit_message>
<xml_diff>
--- a/BusinessLogic/Docs/EdaWorkshop_Sprint2.pptx
+++ b/BusinessLogic/Docs/EdaWorkshop_Sprint2.pptx
@@ -259,7 +259,7 @@
           <a:p>
             <a:fld id="{0B5D536D-AE8C-4EAC-8CEB-B18A64A144B4}" type="datetimeFigureOut">
               <a:rPr lang="en-US" smtClean="0"/>
-              <a:t>10/5/2021</a:t>
+              <a:t>10/6/2021</a:t>
             </a:fld>
             <a:endParaRPr lang="en-US"/>
           </a:p>
@@ -429,7 +429,7 @@
           <a:p>
             <a:fld id="{0B5D536D-AE8C-4EAC-8CEB-B18A64A144B4}" type="datetimeFigureOut">
               <a:rPr lang="en-US" smtClean="0"/>
-              <a:t>10/5/2021</a:t>
+              <a:t>10/6/2021</a:t>
             </a:fld>
             <a:endParaRPr lang="en-US"/>
           </a:p>
@@ -609,7 +609,7 @@
           <a:p>
             <a:fld id="{0B5D536D-AE8C-4EAC-8CEB-B18A64A144B4}" type="datetimeFigureOut">
               <a:rPr lang="en-US" smtClean="0"/>
-              <a:t>10/5/2021</a:t>
+              <a:t>10/6/2021</a:t>
             </a:fld>
             <a:endParaRPr lang="en-US"/>
           </a:p>
@@ -779,7 +779,7 @@
           <a:p>
             <a:fld id="{0B5D536D-AE8C-4EAC-8CEB-B18A64A144B4}" type="datetimeFigureOut">
               <a:rPr lang="en-US" smtClean="0"/>
-              <a:t>10/5/2021</a:t>
+              <a:t>10/6/2021</a:t>
             </a:fld>
             <a:endParaRPr lang="en-US"/>
           </a:p>
@@ -1025,7 +1025,7 @@
           <a:p>
             <a:fld id="{0B5D536D-AE8C-4EAC-8CEB-B18A64A144B4}" type="datetimeFigureOut">
               <a:rPr lang="en-US" smtClean="0"/>
-              <a:t>10/5/2021</a:t>
+              <a:t>10/6/2021</a:t>
             </a:fld>
             <a:endParaRPr lang="en-US"/>
           </a:p>
@@ -1257,7 +1257,7 @@
           <a:p>
             <a:fld id="{0B5D536D-AE8C-4EAC-8CEB-B18A64A144B4}" type="datetimeFigureOut">
               <a:rPr lang="en-US" smtClean="0"/>
-              <a:t>10/5/2021</a:t>
+              <a:t>10/6/2021</a:t>
             </a:fld>
             <a:endParaRPr lang="en-US"/>
           </a:p>
@@ -1624,7 +1624,7 @@
           <a:p>
             <a:fld id="{0B5D536D-AE8C-4EAC-8CEB-B18A64A144B4}" type="datetimeFigureOut">
               <a:rPr lang="en-US" smtClean="0"/>
-              <a:t>10/5/2021</a:t>
+              <a:t>10/6/2021</a:t>
             </a:fld>
             <a:endParaRPr lang="en-US"/>
           </a:p>
@@ -1742,7 +1742,7 @@
           <a:p>
             <a:fld id="{0B5D536D-AE8C-4EAC-8CEB-B18A64A144B4}" type="datetimeFigureOut">
               <a:rPr lang="en-US" smtClean="0"/>
-              <a:t>10/5/2021</a:t>
+              <a:t>10/6/2021</a:t>
             </a:fld>
             <a:endParaRPr lang="en-US"/>
           </a:p>
@@ -1837,7 +1837,7 @@
           <a:p>
             <a:fld id="{0B5D536D-AE8C-4EAC-8CEB-B18A64A144B4}" type="datetimeFigureOut">
               <a:rPr lang="en-US" smtClean="0"/>
-              <a:t>10/5/2021</a:t>
+              <a:t>10/6/2021</a:t>
             </a:fld>
             <a:endParaRPr lang="en-US"/>
           </a:p>
@@ -2114,7 +2114,7 @@
           <a:p>
             <a:fld id="{0B5D536D-AE8C-4EAC-8CEB-B18A64A144B4}" type="datetimeFigureOut">
               <a:rPr lang="en-US" smtClean="0"/>
-              <a:t>10/5/2021</a:t>
+              <a:t>10/6/2021</a:t>
             </a:fld>
             <a:endParaRPr lang="en-US"/>
           </a:p>
@@ -2367,7 +2367,7 @@
           <a:p>
             <a:fld id="{0B5D536D-AE8C-4EAC-8CEB-B18A64A144B4}" type="datetimeFigureOut">
               <a:rPr lang="en-US" smtClean="0"/>
-              <a:t>10/5/2021</a:t>
+              <a:t>10/6/2021</a:t>
             </a:fld>
             <a:endParaRPr lang="en-US"/>
           </a:p>
@@ -2580,7 +2580,7 @@
           <a:p>
             <a:fld id="{0B5D536D-AE8C-4EAC-8CEB-B18A64A144B4}" type="datetimeFigureOut">
               <a:rPr lang="en-US" smtClean="0"/>
-              <a:t>10/5/2021</a:t>
+              <a:t>10/6/2021</a:t>
             </a:fld>
             <a:endParaRPr lang="en-US"/>
           </a:p>
@@ -4614,7 +4614,7 @@
         </p:spPr>
         <p:txBody>
           <a:bodyPr>
-            <a:normAutofit lnSpcReduction="10000"/>
+            <a:normAutofit/>
           </a:bodyPr>
           <a:lstStyle/>
           <a:p>
@@ -4628,22 +4628,10 @@
           </a:p>
           <a:p>
             <a:r>
-              <a:rPr lang="en-US" dirty="0" smtClean="0"/>
-              <a:t>Use the same Publish Profile we created in Sprint 1</a:t>
-            </a:r>
-          </a:p>
-          <a:p>
-            <a:pPr lvl="1"/>
-            <a:r>
-              <a:rPr lang="en-US" dirty="0" smtClean="0"/>
-              <a:t>New Function App</a:t>
-            </a:r>
-          </a:p>
-          <a:p>
-            <a:r>
-              <a:rPr lang="en-US" dirty="0" smtClean="0"/>
+              <a:rPr lang="en-US" smtClean="0"/>
               <a:t>Publish</a:t>
             </a:r>
+            <a:endParaRPr lang="en-US" dirty="0" smtClean="0"/>
           </a:p>
           <a:p>
             <a:r>
@@ -4782,11 +4770,7 @@
           <a:p>
             <a:r>
               <a:rPr lang="en-US" dirty="0" smtClean="0"/>
-              <a:t>Taking </a:t>
-            </a:r>
-            <a:r>
-              <a:rPr lang="en-US" dirty="0" smtClean="0"/>
-              <a:t>advantage </a:t>
+              <a:t>Taking advantage </a:t>
             </a:r>
             <a:r>
               <a:rPr lang="en-US" dirty="0"/>

</xml_diff>